<commit_message>
Updated CI/CD documentation (small fix)
Specified that minifier step moves all files from src/ into dist/ (code gets minified, other files simply get copieid)
</commit_message>
<xml_diff>
--- a/documentation/CICD/CICD 06072023.pptx
+++ b/documentation/CICD/CICD 06072023.pptx
@@ -137,6 +137,45 @@
 
 <file path=ppt/changesInfos/changesInfo1.xml><?xml version="1.0" encoding="utf-8"?>
 <pc:chgInfo xmlns:a="http://schemas.openxmlformats.org/drawingml/2006/main" xmlns:r="http://schemas.openxmlformats.org/officeDocument/2006/relationships" xmlns:ac="http://schemas.microsoft.com/office/drawing/2013/main/command" xmlns:pc="http://schemas.microsoft.com/office/powerpoint/2013/main/command">
+  <pc:docChgLst>
+    <pc:chgData name="Gil Keidar" userId="39bab330baa1541e" providerId="LiveId" clId="{93598B22-55E5-4E72-B50B-9C1AB97EE538}"/>
+    <pc:docChg chg="modSld">
+      <pc:chgData name="Gil Keidar" userId="39bab330baa1541e" providerId="LiveId" clId="{93598B22-55E5-4E72-B50B-9C1AB97EE538}" dt="2023-06-08T00:09:03.521" v="661" actId="20577"/>
+      <pc:docMkLst>
+        <pc:docMk/>
+      </pc:docMkLst>
+      <pc:sldChg chg="modSp mod">
+        <pc:chgData name="Gil Keidar" userId="39bab330baa1541e" providerId="LiveId" clId="{93598B22-55E5-4E72-B50B-9C1AB97EE538}" dt="2023-06-08T00:09:03.521" v="661" actId="20577"/>
+        <pc:sldMkLst>
+          <pc:docMk/>
+          <pc:sldMk cId="3658202504" sldId="270"/>
+        </pc:sldMkLst>
+        <pc:spChg chg="mod">
+          <ac:chgData name="Gil Keidar" userId="39bab330baa1541e" providerId="LiveId" clId="{93598B22-55E5-4E72-B50B-9C1AB97EE538}" dt="2023-06-08T00:09:03.521" v="661" actId="20577"/>
+          <ac:spMkLst>
+            <pc:docMk/>
+            <pc:sldMk cId="3658202504" sldId="270"/>
+            <ac:spMk id="3" creationId="{B53C54CD-711C-2E0F-EF47-69BAA88E4C7D}"/>
+          </ac:spMkLst>
+        </pc:spChg>
+      </pc:sldChg>
+      <pc:sldChg chg="modSp mod">
+        <pc:chgData name="Gil Keidar" userId="39bab330baa1541e" providerId="LiveId" clId="{93598B22-55E5-4E72-B50B-9C1AB97EE538}" dt="2023-06-08T00:05:49.638" v="46" actId="20577"/>
+        <pc:sldMkLst>
+          <pc:docMk/>
+          <pc:sldMk cId="931670563" sldId="271"/>
+        </pc:sldMkLst>
+        <pc:spChg chg="mod">
+          <ac:chgData name="Gil Keidar" userId="39bab330baa1541e" providerId="LiveId" clId="{93598B22-55E5-4E72-B50B-9C1AB97EE538}" dt="2023-06-08T00:05:49.638" v="46" actId="20577"/>
+          <ac:spMkLst>
+            <pc:docMk/>
+            <pc:sldMk cId="931670563" sldId="271"/>
+            <ac:spMk id="3" creationId="{B53C54CD-711C-2E0F-EF47-69BAA88E4C7D}"/>
+          </ac:spMkLst>
+        </pc:spChg>
+      </pc:sldChg>
+    </pc:docChg>
+  </pc:docChgLst>
   <pc:docChgLst>
     <pc:chgData name="Gil Keidar" userId="39bab330baa1541e" providerId="LiveId" clId="{4F3946CB-0C03-4512-8698-CA63C6373556}"/>
     <pc:docChg chg="undo custSel modSld">
@@ -4685,7 +4724,15 @@
           <a:p>
             <a:r>
               <a:rPr lang="en-US" dirty="0"/>
-              <a:t>Minimized code goes in the </a:t>
+              <a:t>Minifies files in </a:t>
+            </a:r>
+            <a:r>
+              <a:rPr lang="en-US" dirty="0" err="1"/>
+              <a:t>src</a:t>
+            </a:r>
+            <a:r>
+              <a:rPr lang="en-US" dirty="0"/>
+              <a:t>/ and puts the minified versions in </a:t>
             </a:r>
             <a:r>
               <a:rPr lang="en-US" dirty="0" err="1"/>
@@ -4693,8 +4740,69 @@
             </a:r>
             <a:r>
               <a:rPr lang="en-US" dirty="0"/>
-              <a:t>/ folder</a:t>
-            </a:r>
+              <a:t>/</a:t>
+            </a:r>
+          </a:p>
+          <a:p>
+            <a:pPr lvl="1"/>
+            <a:r>
+              <a:rPr lang="en-US" dirty="0"/>
+              <a:t>Code (HTML, CSS, JS) gets minified and put in </a:t>
+            </a:r>
+            <a:r>
+              <a:rPr lang="en-US" dirty="0" err="1"/>
+              <a:t>dist</a:t>
+            </a:r>
+            <a:r>
+              <a:rPr lang="en-US" dirty="0"/>
+              <a:t>/</a:t>
+            </a:r>
+          </a:p>
+          <a:p>
+            <a:pPr lvl="1"/>
+            <a:r>
+              <a:rPr lang="en-US" dirty="0"/>
+              <a:t>All other files (e.g. JSON, pictures, sound files, etc.) simply get copied</a:t>
+            </a:r>
+          </a:p>
+          <a:p>
+            <a:pPr lvl="1"/>
+            <a:r>
+              <a:rPr lang="en-US" dirty="0"/>
+              <a:t>All relevant files </a:t>
+            </a:r>
+            <a:r>
+              <a:rPr lang="en-US" b="1" dirty="0"/>
+              <a:t>MUST</a:t>
+            </a:r>
+            <a:r>
+              <a:rPr lang="en-US" dirty="0"/>
+              <a:t> be in </a:t>
+            </a:r>
+            <a:r>
+              <a:rPr lang="en-US" dirty="0" err="1"/>
+              <a:t>src</a:t>
+            </a:r>
+            <a:r>
+              <a:rPr lang="en-US" dirty="0"/>
+              <a:t> folder</a:t>
+            </a:r>
+          </a:p>
+          <a:p>
+            <a:pPr lvl="2"/>
+            <a:r>
+              <a:rPr lang="en-US" dirty="0"/>
+              <a:t>That means that we need to move the assets/ folder into the </a:t>
+            </a:r>
+            <a:r>
+              <a:rPr lang="en-US" dirty="0" err="1"/>
+              <a:t>src</a:t>
+            </a:r>
+            <a:r>
+              <a:rPr lang="en-US"/>
+              <a:t>/ folder!</a:t>
+            </a:r>
+            <a:endParaRPr lang="en-US" dirty="0"/>
           </a:p>
           <a:p>
             <a:r>
@@ -4864,11 +4972,11 @@
               <a:t>gh</a:t>
             </a:r>
             <a:r>
-              <a:rPr lang="en-US"/>
+              <a:rPr lang="en-US" dirty="0"/>
               <a:t>-pages branch to </a:t>
             </a:r>
             <a:r>
-              <a:rPr lang="en-US">
+              <a:rPr lang="en-US" dirty="0">
                 <a:hlinkClick r:id="rId2"/>
               </a:rPr>
               <a:t>https://cse110-sp23-group21.github.io/map-my-future/</a:t>

</xml_diff>